<commit_message>
reorder flow, typo, make a little shorter
</commit_message>
<xml_diff>
--- a/TestFlow.pptx
+++ b/TestFlow.pptx
@@ -303,7 +303,7 @@
             <a:fld id="{385C14C5-1CFE-4911-8CD9-CC6FA2EA80E0}" type="datetimeFigureOut">
               <a:rPr lang="en-US" smtClean="0"/>
               <a:pPr/>
-              <a:t>10/28/18</a:t>
+              <a:t>11/8/19</a:t>
             </a:fld>
             <a:endParaRPr lang="en-US"/>
           </a:p>
@@ -468,7 +468,7 @@
             <a:fld id="{385C14C5-1CFE-4911-8CD9-CC6FA2EA80E0}" type="datetimeFigureOut">
               <a:rPr lang="en-US" smtClean="0"/>
               <a:pPr/>
-              <a:t>10/28/18</a:t>
+              <a:t>11/8/19</a:t>
             </a:fld>
             <a:endParaRPr lang="en-US"/>
           </a:p>
@@ -643,7 +643,7 @@
             <a:fld id="{385C14C5-1CFE-4911-8CD9-CC6FA2EA80E0}" type="datetimeFigureOut">
               <a:rPr lang="en-US" smtClean="0"/>
               <a:pPr/>
-              <a:t>10/28/18</a:t>
+              <a:t>11/8/19</a:t>
             </a:fld>
             <a:endParaRPr lang="en-US"/>
           </a:p>
@@ -808,7 +808,7 @@
             <a:fld id="{385C14C5-1CFE-4911-8CD9-CC6FA2EA80E0}" type="datetimeFigureOut">
               <a:rPr lang="en-US" smtClean="0"/>
               <a:pPr/>
-              <a:t>10/28/18</a:t>
+              <a:t>11/8/19</a:t>
             </a:fld>
             <a:endParaRPr lang="en-US"/>
           </a:p>
@@ -1050,7 +1050,7 @@
             <a:fld id="{385C14C5-1CFE-4911-8CD9-CC6FA2EA80E0}" type="datetimeFigureOut">
               <a:rPr lang="en-US" smtClean="0"/>
               <a:pPr/>
-              <a:t>10/28/18</a:t>
+              <a:t>11/8/19</a:t>
             </a:fld>
             <a:endParaRPr lang="en-US"/>
           </a:p>
@@ -1332,7 +1332,7 @@
             <a:fld id="{385C14C5-1CFE-4911-8CD9-CC6FA2EA80E0}" type="datetimeFigureOut">
               <a:rPr lang="en-US" smtClean="0"/>
               <a:pPr/>
-              <a:t>10/28/18</a:t>
+              <a:t>11/8/19</a:t>
             </a:fld>
             <a:endParaRPr lang="en-US"/>
           </a:p>
@@ -1748,7 +1748,7 @@
             <a:fld id="{385C14C5-1CFE-4911-8CD9-CC6FA2EA80E0}" type="datetimeFigureOut">
               <a:rPr lang="en-US" smtClean="0"/>
               <a:pPr/>
-              <a:t>10/28/18</a:t>
+              <a:t>11/8/19</a:t>
             </a:fld>
             <a:endParaRPr lang="en-US"/>
           </a:p>
@@ -1862,7 +1862,7 @@
             <a:fld id="{385C14C5-1CFE-4911-8CD9-CC6FA2EA80E0}" type="datetimeFigureOut">
               <a:rPr lang="en-US" smtClean="0"/>
               <a:pPr/>
-              <a:t>10/28/18</a:t>
+              <a:t>11/8/19</a:t>
             </a:fld>
             <a:endParaRPr lang="en-US"/>
           </a:p>
@@ -1954,7 +1954,7 @@
             <a:fld id="{385C14C5-1CFE-4911-8CD9-CC6FA2EA80E0}" type="datetimeFigureOut">
               <a:rPr lang="en-US" smtClean="0"/>
               <a:pPr/>
-              <a:t>10/28/18</a:t>
+              <a:t>11/8/19</a:t>
             </a:fld>
             <a:endParaRPr lang="en-US"/>
           </a:p>
@@ -2226,7 +2226,7 @@
             <a:fld id="{385C14C5-1CFE-4911-8CD9-CC6FA2EA80E0}" type="datetimeFigureOut">
               <a:rPr lang="en-US" smtClean="0"/>
               <a:pPr/>
-              <a:t>10/28/18</a:t>
+              <a:t>11/8/19</a:t>
             </a:fld>
             <a:endParaRPr lang="en-US"/>
           </a:p>
@@ -2475,7 +2475,7 @@
             <a:fld id="{385C14C5-1CFE-4911-8CD9-CC6FA2EA80E0}" type="datetimeFigureOut">
               <a:rPr lang="en-US" smtClean="0"/>
               <a:pPr/>
-              <a:t>10/28/18</a:t>
+              <a:t>11/8/19</a:t>
             </a:fld>
             <a:endParaRPr lang="en-US"/>
           </a:p>
@@ -2683,7 +2683,7 @@
             <a:fld id="{385C14C5-1CFE-4911-8CD9-CC6FA2EA80E0}" type="datetimeFigureOut">
               <a:rPr lang="en-US" smtClean="0"/>
               <a:pPr/>
-              <a:t>10/28/18</a:t>
+              <a:t>11/8/19</a:t>
             </a:fld>
             <a:endParaRPr lang="en-US"/>
           </a:p>
@@ -3115,7 +3115,7 @@
         </p:nvSpPr>
         <p:spPr>
           <a:xfrm>
-            <a:off x="4175124" y="3810000"/>
+            <a:off x="4320737" y="2454208"/>
             <a:ext cx="1844671" cy="1010866"/>
           </a:xfrm>
           <a:prstGeom prst="rect">
@@ -3161,20 +3161,12 @@
           <a:p>
             <a:pPr algn="ctr"/>
             <a:r>
-              <a:rPr lang="en-US" dirty="0" err="1">
-                <a:solidFill>
-                  <a:schemeClr val="tx1"/>
-                </a:solidFill>
-              </a:rPr>
-              <a:t>Verificaton</a:t>
-            </a:r>
-            <a:r>
               <a:rPr lang="en-US" dirty="0">
                 <a:solidFill>
                   <a:schemeClr val="tx1"/>
                 </a:solidFill>
               </a:rPr>
-              <a:t> Tool</a:t>
+              <a:t>Verification Tool</a:t>
             </a:r>
           </a:p>
         </p:txBody>
@@ -3184,13 +3176,14 @@
           <p:cNvPr id="26" name="Straight Arrow Connector 25"/>
           <p:cNvCxnSpPr>
             <a:cxnSpLocks/>
+            <a:endCxn id="36" idx="1"/>
           </p:cNvCxnSpPr>
           <p:nvPr/>
         </p:nvCxnSpPr>
         <p:spPr>
           <a:xfrm>
-            <a:off x="3263106" y="1787769"/>
-            <a:ext cx="1510507" cy="726831"/>
+            <a:off x="3657600" y="1163022"/>
+            <a:ext cx="640913" cy="521336"/>
           </a:xfrm>
           <a:prstGeom prst="straightConnector1">
             <a:avLst/>
@@ -3223,7 +3216,7 @@
         </p:nvSpPr>
         <p:spPr>
           <a:xfrm>
-            <a:off x="956059" y="5562600"/>
+            <a:off x="1590627" y="4595655"/>
             <a:ext cx="2345449" cy="646331"/>
           </a:xfrm>
           <a:prstGeom prst="rect">
@@ -3268,7 +3261,7 @@
         </p:blipFill>
         <p:spPr>
           <a:xfrm>
-            <a:off x="1905000" y="4572000"/>
+            <a:off x="2246168" y="3678545"/>
             <a:ext cx="838200" cy="916172"/>
           </a:xfrm>
           <a:prstGeom prst="rect">
@@ -3284,7 +3277,7 @@
         </p:nvSpPr>
         <p:spPr>
           <a:xfrm>
-            <a:off x="4175125" y="2587625"/>
+            <a:off x="4298513" y="1303358"/>
             <a:ext cx="1851024" cy="762000"/>
           </a:xfrm>
           <a:prstGeom prst="rect">
@@ -3334,13 +3327,15 @@
           <p:cNvPr id="38" name="Straight Arrow Connector 37"/>
           <p:cNvCxnSpPr>
             <a:cxnSpLocks/>
+            <a:stCxn id="4" idx="2"/>
+            <a:endCxn id="5" idx="1"/>
           </p:cNvCxnSpPr>
           <p:nvPr/>
         </p:nvCxnSpPr>
         <p:spPr>
           <a:xfrm>
-            <a:off x="2617788" y="1711569"/>
-            <a:ext cx="1497012" cy="2067686"/>
+            <a:off x="2667000" y="1676400"/>
+            <a:ext cx="1653737" cy="1283241"/>
           </a:xfrm>
           <a:prstGeom prst="straightConnector1">
             <a:avLst/>
@@ -3373,7 +3368,7 @@
         </p:nvSpPr>
         <p:spPr>
           <a:xfrm flipH="1">
-            <a:off x="228600" y="1066800"/>
+            <a:off x="291956" y="685800"/>
             <a:ext cx="1447800" cy="3886200"/>
           </a:xfrm>
           <a:prstGeom prst="curvedLeftArrow">
@@ -3420,13 +3415,15 @@
           <p:cNvPr id="52" name="Straight Arrow Connector 51"/>
           <p:cNvCxnSpPr>
             <a:cxnSpLocks/>
+            <a:stCxn id="36" idx="1"/>
+            <a:endCxn id="3" idx="0"/>
           </p:cNvCxnSpPr>
           <p:nvPr/>
         </p:nvCxnSpPr>
         <p:spPr>
           <a:xfrm flipH="1">
-            <a:off x="1981200" y="3009900"/>
-            <a:ext cx="2133600" cy="1485900"/>
+            <a:off x="2665268" y="1684358"/>
+            <a:ext cx="1633245" cy="1994187"/>
           </a:xfrm>
           <a:prstGeom prst="straightConnector1">
             <a:avLst/>
@@ -3456,13 +3453,15 @@
           <p:cNvPr id="55" name="Straight Arrow Connector 54"/>
           <p:cNvCxnSpPr>
             <a:cxnSpLocks/>
+            <a:stCxn id="5" idx="1"/>
+            <a:endCxn id="3" idx="0"/>
           </p:cNvCxnSpPr>
           <p:nvPr/>
         </p:nvCxnSpPr>
         <p:spPr>
           <a:xfrm flipH="1">
-            <a:off x="2000250" y="4160255"/>
-            <a:ext cx="2114550" cy="335545"/>
+            <a:off x="2665268" y="2959641"/>
+            <a:ext cx="1655469" cy="718904"/>
           </a:xfrm>
           <a:prstGeom prst="straightConnector1">
             <a:avLst/>
@@ -3495,7 +3494,7 @@
         </p:nvSpPr>
         <p:spPr>
           <a:xfrm>
-            <a:off x="615808" y="2047048"/>
+            <a:off x="636778" y="1823755"/>
             <a:ext cx="974819" cy="646331"/>
           </a:xfrm>
           <a:prstGeom prst="rect">
@@ -3532,8 +3531,8 @@
         </p:nvSpPr>
         <p:spPr>
           <a:xfrm>
-            <a:off x="6629400" y="3581400"/>
-            <a:ext cx="1676400" cy="1066800"/>
+            <a:off x="6629400" y="3200400"/>
+            <a:ext cx="1676400" cy="914400"/>
           </a:xfrm>
           <a:prstGeom prst="rect">
             <a:avLst/>
@@ -3568,18 +3567,13 @@
           <a:p>
             <a:pPr algn="ctr"/>
             <a:r>
-              <a:rPr lang="en-US" b="1">
+              <a:rPr lang="en-US" b="1" dirty="0">
                 <a:solidFill>
                   <a:schemeClr val="tx1"/>
                 </a:solidFill>
               </a:rPr>
-              <a:t>Feedback Analysis</a:t>
-            </a:r>
-            <a:endParaRPr lang="en-US" b="1" dirty="0">
-              <a:solidFill>
-                <a:schemeClr val="tx1"/>
-              </a:solidFill>
-            </a:endParaRPr>
+              <a:t>Mutant Utility Predictor</a:t>
+            </a:r>
           </a:p>
         </p:txBody>
       </p:sp>
@@ -3592,7 +3586,7 @@
         <p:spPr>
           <a:xfrm>
             <a:off x="6629400" y="762000"/>
-            <a:ext cx="1676400" cy="1066800"/>
+            <a:ext cx="1676400" cy="914400"/>
           </a:xfrm>
           <a:prstGeom prst="rect">
             <a:avLst/>
@@ -3632,7 +3626,7 @@
                   <a:schemeClr val="tx1"/>
                 </a:solidFill>
               </a:rPr>
-              <a:t>FPF-Based Novelty Ranking</a:t>
+              <a:t>Mutant Generator</a:t>
             </a:r>
           </a:p>
         </p:txBody>
@@ -3645,8 +3639,8 @@
         </p:nvSpPr>
         <p:spPr>
           <a:xfrm>
-            <a:off x="6629400" y="2133600"/>
-            <a:ext cx="1676400" cy="1066800"/>
+            <a:off x="6629400" y="1981200"/>
+            <a:ext cx="1676400" cy="914400"/>
           </a:xfrm>
           <a:prstGeom prst="rect">
             <a:avLst/>
@@ -3686,7 +3680,7 @@
                   <a:schemeClr val="tx1"/>
                 </a:solidFill>
               </a:rPr>
-              <a:t>Mutant Utility Predictor</a:t>
+              <a:t>FPF-Based Novelty Ranking</a:t>
             </a:r>
           </a:p>
         </p:txBody>
@@ -3699,8 +3693,8 @@
         </p:nvSpPr>
         <p:spPr>
           <a:xfrm>
-            <a:off x="6629400" y="5029200"/>
-            <a:ext cx="1676400" cy="1066800"/>
+            <a:off x="6629400" y="4419600"/>
+            <a:ext cx="1676400" cy="914400"/>
           </a:xfrm>
           <a:prstGeom prst="rect">
             <a:avLst/>
@@ -3740,7 +3734,7 @@
                   <a:schemeClr val="tx1"/>
                 </a:solidFill>
               </a:rPr>
-              <a:t>Mutant Generator</a:t>
+              <a:t>Feedback Analysis</a:t>
             </a:r>
           </a:p>
         </p:txBody>
@@ -3748,13 +3742,15 @@
       <p:cxnSp>
         <p:nvCxnSpPr>
           <p:cNvPr id="1051" name="Straight Connector 1050"/>
-          <p:cNvCxnSpPr/>
+          <p:cNvCxnSpPr>
+            <a:cxnSpLocks/>
+          </p:cNvCxnSpPr>
           <p:nvPr/>
         </p:nvCxnSpPr>
         <p:spPr>
           <a:xfrm>
-            <a:off x="8534400" y="990600"/>
-            <a:ext cx="0" cy="4876800"/>
+            <a:off x="8458200" y="685800"/>
+            <a:ext cx="76200" cy="4876800"/>
           </a:xfrm>
           <a:prstGeom prst="line">
             <a:avLst/>
@@ -3783,7 +3779,7 @@
         </p:nvCxnSpPr>
         <p:spPr>
           <a:xfrm flipH="1">
-            <a:off x="8458200" y="990600"/>
+            <a:off x="8382000" y="685800"/>
             <a:ext cx="76200" cy="0"/>
           </a:xfrm>
           <a:prstGeom prst="line">
@@ -3813,7 +3809,7 @@
         </p:nvCxnSpPr>
         <p:spPr>
           <a:xfrm flipH="1">
-            <a:off x="8458200" y="5867400"/>
+            <a:off x="8458200" y="5562600"/>
             <a:ext cx="76200" cy="0"/>
           </a:xfrm>
           <a:prstGeom prst="line">
@@ -4003,7 +3999,7 @@
         <p:spPr>
           <a:xfrm flipH="1">
             <a:off x="1963881" y="1742248"/>
-            <a:ext cx="55419" cy="2755324"/>
+            <a:ext cx="55419" cy="2377440"/>
           </a:xfrm>
           <a:prstGeom prst="straightConnector1">
             <a:avLst/>
@@ -4042,8 +4038,8 @@
         </p:nvSpPr>
         <p:spPr>
           <a:xfrm>
-            <a:off x="2247766" y="3119910"/>
-            <a:ext cx="1309654" cy="369332"/>
+            <a:off x="2071855" y="2677397"/>
+            <a:ext cx="1413320" cy="369332"/>
           </a:xfrm>
           <a:prstGeom prst="rect">
             <a:avLst/>
@@ -4051,7 +4047,7 @@
           <a:noFill/>
         </p:spPr>
         <p:txBody>
-          <a:bodyPr wrap="none" rtlCol="0">
+          <a:bodyPr wrap="square" rtlCol="0">
             <a:spAutoFit/>
           </a:bodyPr>
           <a:lstStyle/>
@@ -4078,7 +4074,7 @@
         </p:nvSpPr>
         <p:spPr>
           <a:xfrm>
-            <a:off x="2539836" y="4309612"/>
+            <a:off x="2870664" y="3531551"/>
             <a:ext cx="1599156" cy="369332"/>
           </a:xfrm>
           <a:prstGeom prst="rect">

</xml_diff>

<commit_message>
diagram hasn't changed, ppt just insisted on resaving.  Mostly, this is draftiness cleanup on research plan
</commit_message>
<xml_diff>
--- a/TestFlow.pptx
+++ b/TestFlow.pptx
@@ -3054,1048 +3054,1069 @@
           <a:chExt cx="0" cy="0"/>
         </a:xfrm>
       </p:grpSpPr>
-      <p:sp>
-        <p:nvSpPr>
-          <p:cNvPr id="4" name="Rectangle 3"/>
-          <p:cNvSpPr/>
+      <p:grpSp>
+        <p:nvGrpSpPr>
+          <p:cNvPr id="20" name="Group 19">
+            <a:extLst>
+              <a:ext uri="{FF2B5EF4-FFF2-40B4-BE49-F238E27FC236}">
+                <a16:creationId xmlns:a16="http://schemas.microsoft.com/office/drawing/2014/main" id="{CBA1AD73-2F4A-B042-8973-4F862EA5C892}"/>
+              </a:ext>
+            </a:extLst>
+          </p:cNvPr>
+          <p:cNvGrpSpPr/>
           <p:nvPr/>
-        </p:nvSpPr>
-        <p:spPr>
+        </p:nvGrpSpPr>
+        <p:grpSpPr>
           <a:xfrm>
-            <a:off x="1752600" y="228600"/>
-            <a:ext cx="1828800" cy="1447800"/>
+            <a:off x="291956" y="228600"/>
+            <a:ext cx="8771283" cy="5334000"/>
+            <a:chOff x="291956" y="228600"/>
+            <a:chExt cx="8771283" cy="5334000"/>
           </a:xfrm>
-          <a:prstGeom prst="rect">
-            <a:avLst/>
-          </a:prstGeom>
-          <a:solidFill>
-            <a:schemeClr val="bg2">
-              <a:lumMod val="90000"/>
-            </a:schemeClr>
-          </a:solidFill>
-          <a:ln w="38100"/>
-        </p:spPr>
-        <p:style>
-          <a:lnRef idx="2">
-            <a:schemeClr val="accent1">
-              <a:shade val="50000"/>
-            </a:schemeClr>
-          </a:lnRef>
-          <a:fillRef idx="1">
-            <a:schemeClr val="accent1"/>
-          </a:fillRef>
-          <a:effectRef idx="0">
-            <a:schemeClr val="accent1"/>
-          </a:effectRef>
-          <a:fontRef idx="minor">
-            <a:schemeClr val="lt1"/>
-          </a:fontRef>
-        </p:style>
-        <p:txBody>
-          <a:bodyPr rtlCol="0" anchor="ctr"/>
-          <a:lstStyle/>
-          <a:p>
-            <a:pPr algn="ctr"/>
-            <a:r>
-              <a:rPr lang="en-US" dirty="0">
+        </p:grpSpPr>
+        <p:sp>
+          <p:nvSpPr>
+            <p:cNvPr id="4" name="Rectangle 3"/>
+            <p:cNvSpPr/>
+            <p:nvPr/>
+          </p:nvSpPr>
+          <p:spPr>
+            <a:xfrm>
+              <a:off x="1752600" y="228600"/>
+              <a:ext cx="1828800" cy="1447800"/>
+            </a:xfrm>
+            <a:prstGeom prst="rect">
+              <a:avLst/>
+            </a:prstGeom>
+            <a:solidFill>
+              <a:schemeClr val="bg2">
+                <a:lumMod val="90000"/>
+              </a:schemeClr>
+            </a:solidFill>
+            <a:ln w="38100"/>
+          </p:spPr>
+          <p:style>
+            <a:lnRef idx="2">
+              <a:schemeClr val="accent1">
+                <a:shade val="50000"/>
+              </a:schemeClr>
+            </a:lnRef>
+            <a:fillRef idx="1">
+              <a:schemeClr val="accent1"/>
+            </a:fillRef>
+            <a:effectRef idx="0">
+              <a:schemeClr val="accent1"/>
+            </a:effectRef>
+            <a:fontRef idx="minor">
+              <a:schemeClr val="lt1"/>
+            </a:fontRef>
+          </p:style>
+          <p:txBody>
+            <a:bodyPr rtlCol="0" anchor="ctr"/>
+            <a:lstStyle/>
+            <a:p>
+              <a:pPr algn="ctr"/>
+              <a:r>
+                <a:rPr lang="en-US" dirty="0">
+                  <a:solidFill>
+                    <a:schemeClr val="tx1"/>
+                  </a:solidFill>
+                </a:rPr>
+                <a:t>Feedback-Driven Mutation Testing Framework</a:t>
+              </a:r>
+            </a:p>
+          </p:txBody>
+        </p:sp>
+        <p:sp>
+          <p:nvSpPr>
+            <p:cNvPr id="5" name="Rectangle 4"/>
+            <p:cNvSpPr/>
+            <p:nvPr/>
+          </p:nvSpPr>
+          <p:spPr>
+            <a:xfrm>
+              <a:off x="4320737" y="2454208"/>
+              <a:ext cx="1844671" cy="1010866"/>
+            </a:xfrm>
+            <a:prstGeom prst="rect">
+              <a:avLst/>
+            </a:prstGeom>
+            <a:solidFill>
+              <a:schemeClr val="accent3">
+                <a:lumMod val="40000"/>
+                <a:lumOff val="60000"/>
+              </a:schemeClr>
+            </a:solidFill>
+          </p:spPr>
+          <p:style>
+            <a:lnRef idx="2">
+              <a:schemeClr val="accent1">
+                <a:shade val="50000"/>
+              </a:schemeClr>
+            </a:lnRef>
+            <a:fillRef idx="1">
+              <a:schemeClr val="accent1"/>
+            </a:fillRef>
+            <a:effectRef idx="0">
+              <a:schemeClr val="accent1"/>
+            </a:effectRef>
+            <a:fontRef idx="minor">
+              <a:schemeClr val="lt1"/>
+            </a:fontRef>
+          </p:style>
+          <p:txBody>
+            <a:bodyPr rtlCol="0" anchor="ctr"/>
+            <a:lstStyle/>
+            <a:p>
+              <a:pPr algn="ctr"/>
+              <a:r>
+                <a:rPr lang="en-US" dirty="0">
+                  <a:solidFill>
+                    <a:schemeClr val="tx1"/>
+                  </a:solidFill>
+                </a:rPr>
+                <a:t>Tests/Test Generator/</a:t>
+              </a:r>
+            </a:p>
+            <a:p>
+              <a:pPr algn="ctr"/>
+              <a:r>
+                <a:rPr lang="en-US" dirty="0">
+                  <a:solidFill>
+                    <a:schemeClr val="tx1"/>
+                  </a:solidFill>
+                </a:rPr>
+                <a:t>Verification Tool</a:t>
+              </a:r>
+            </a:p>
+          </p:txBody>
+        </p:sp>
+        <p:cxnSp>
+          <p:nvCxnSpPr>
+            <p:cNvPr id="26" name="Straight Arrow Connector 25"/>
+            <p:cNvCxnSpPr>
+              <a:cxnSpLocks/>
+              <a:endCxn id="36" idx="1"/>
+            </p:cNvCxnSpPr>
+            <p:nvPr/>
+          </p:nvCxnSpPr>
+          <p:spPr>
+            <a:xfrm>
+              <a:off x="3657600" y="1163022"/>
+              <a:ext cx="640913" cy="521336"/>
+            </a:xfrm>
+            <a:prstGeom prst="straightConnector1">
+              <a:avLst/>
+            </a:prstGeom>
+            <a:ln>
+              <a:headEnd type="triangle" w="lg" len="lg"/>
+              <a:tailEnd type="none"/>
+            </a:ln>
+          </p:spPr>
+          <p:style>
+            <a:lnRef idx="1">
+              <a:schemeClr val="accent1"/>
+            </a:lnRef>
+            <a:fillRef idx="0">
+              <a:schemeClr val="accent1"/>
+            </a:fillRef>
+            <a:effectRef idx="0">
+              <a:schemeClr val="accent1"/>
+            </a:effectRef>
+            <a:fontRef idx="minor">
+              <a:schemeClr val="tx1"/>
+            </a:fontRef>
+          </p:style>
+        </p:cxnSp>
+        <p:sp>
+          <p:nvSpPr>
+            <p:cNvPr id="32" name="TextBox 31"/>
+            <p:cNvSpPr txBox="1"/>
+            <p:nvPr/>
+          </p:nvSpPr>
+          <p:spPr>
+            <a:xfrm>
+              <a:off x="1590627" y="4595655"/>
+              <a:ext cx="2345449" cy="646331"/>
+            </a:xfrm>
+            <a:prstGeom prst="rect">
+              <a:avLst/>
+            </a:prstGeom>
+            <a:noFill/>
+          </p:spPr>
+          <p:txBody>
+            <a:bodyPr wrap="none" rtlCol="0">
+              <a:spAutoFit/>
+            </a:bodyPr>
+            <a:lstStyle/>
+            <a:p>
+              <a:pPr algn="ctr"/>
+              <a:r>
+                <a:rPr lang="en-US" dirty="0"/>
+                <a:t>Developer/verification</a:t>
+              </a:r>
+              <a:br>
+                <a:rPr lang="en-US" dirty="0"/>
+              </a:br>
+              <a:r>
+                <a:rPr lang="en-US" dirty="0"/>
+                <a:t>or test engineer</a:t>
+              </a:r>
+            </a:p>
+          </p:txBody>
+        </p:sp>
+        <p:pic>
+          <p:nvPicPr>
+            <p:cNvPr id="3" name="Picture 2"/>
+            <p:cNvPicPr>
+              <a:picLocks noChangeAspect="1"/>
+            </p:cNvPicPr>
+            <p:nvPr/>
+          </p:nvPicPr>
+          <p:blipFill>
+            <a:blip r:embed="rId2"/>
+            <a:stretch>
+              <a:fillRect/>
+            </a:stretch>
+          </p:blipFill>
+          <p:spPr>
+            <a:xfrm>
+              <a:off x="2246168" y="3678545"/>
+              <a:ext cx="838200" cy="916172"/>
+            </a:xfrm>
+            <a:prstGeom prst="rect">
+              <a:avLst/>
+            </a:prstGeom>
+          </p:spPr>
+        </p:pic>
+        <p:sp>
+          <p:nvSpPr>
+            <p:cNvPr id="36" name="Rectangle 35"/>
+            <p:cNvSpPr/>
+            <p:nvPr/>
+          </p:nvSpPr>
+          <p:spPr>
+            <a:xfrm>
+              <a:off x="4298513" y="1303358"/>
+              <a:ext cx="1851024" cy="762000"/>
+            </a:xfrm>
+            <a:prstGeom prst="rect">
+              <a:avLst/>
+            </a:prstGeom>
+            <a:solidFill>
+              <a:schemeClr val="accent3">
+                <a:lumMod val="40000"/>
+                <a:lumOff val="60000"/>
+              </a:schemeClr>
+            </a:solidFill>
+          </p:spPr>
+          <p:style>
+            <a:lnRef idx="2">
+              <a:schemeClr val="accent1">
+                <a:shade val="50000"/>
+              </a:schemeClr>
+            </a:lnRef>
+            <a:fillRef idx="1">
+              <a:schemeClr val="accent1"/>
+            </a:fillRef>
+            <a:effectRef idx="0">
+              <a:schemeClr val="accent1"/>
+            </a:effectRef>
+            <a:fontRef idx="minor">
+              <a:schemeClr val="lt1"/>
+            </a:fontRef>
+          </p:style>
+          <p:txBody>
+            <a:bodyPr rtlCol="0" anchor="ctr"/>
+            <a:lstStyle/>
+            <a:p>
+              <a:pPr algn="ctr"/>
+              <a:r>
+                <a:rPr lang="en-US" dirty="0">
+                  <a:solidFill>
+                    <a:schemeClr val="tx1"/>
+                  </a:solidFill>
+                </a:rPr>
+                <a:t>SUT Source</a:t>
+              </a:r>
+            </a:p>
+          </p:txBody>
+        </p:sp>
+        <p:cxnSp>
+          <p:nvCxnSpPr>
+            <p:cNvPr id="38" name="Straight Arrow Connector 37"/>
+            <p:cNvCxnSpPr>
+              <a:cxnSpLocks/>
+              <a:stCxn id="4" idx="2"/>
+              <a:endCxn id="5" idx="1"/>
+            </p:cNvCxnSpPr>
+            <p:nvPr/>
+          </p:nvCxnSpPr>
+          <p:spPr>
+            <a:xfrm>
+              <a:off x="2667000" y="1676400"/>
+              <a:ext cx="1653737" cy="1283241"/>
+            </a:xfrm>
+            <a:prstGeom prst="straightConnector1">
+              <a:avLst/>
+            </a:prstGeom>
+            <a:ln>
+              <a:headEnd type="triangle" w="lg" len="lg"/>
+              <a:tailEnd type="none"/>
+            </a:ln>
+          </p:spPr>
+          <p:style>
+            <a:lnRef idx="1">
+              <a:schemeClr val="accent1"/>
+            </a:lnRef>
+            <a:fillRef idx="0">
+              <a:schemeClr val="accent1"/>
+            </a:fillRef>
+            <a:effectRef idx="0">
+              <a:schemeClr val="accent1"/>
+            </a:effectRef>
+            <a:fontRef idx="minor">
+              <a:schemeClr val="tx1"/>
+            </a:fontRef>
+          </p:style>
+        </p:cxnSp>
+        <p:sp>
+          <p:nvSpPr>
+            <p:cNvPr id="51" name="Curved Left Arrow 50"/>
+            <p:cNvSpPr/>
+            <p:nvPr/>
+          </p:nvSpPr>
+          <p:spPr>
+            <a:xfrm flipH="1">
+              <a:off x="291956" y="685800"/>
+              <a:ext cx="1447800" cy="3886200"/>
+            </a:xfrm>
+            <a:prstGeom prst="curvedLeftArrow">
+              <a:avLst/>
+            </a:prstGeom>
+            <a:solidFill>
+              <a:schemeClr val="tx1">
+                <a:lumMod val="50000"/>
+                <a:lumOff val="50000"/>
+              </a:schemeClr>
+            </a:solidFill>
+          </p:spPr>
+          <p:style>
+            <a:lnRef idx="2">
+              <a:schemeClr val="accent1">
+                <a:shade val="50000"/>
+              </a:schemeClr>
+            </a:lnRef>
+            <a:fillRef idx="1">
+              <a:schemeClr val="accent1"/>
+            </a:fillRef>
+            <a:effectRef idx="0">
+              <a:schemeClr val="accent1"/>
+            </a:effectRef>
+            <a:fontRef idx="minor">
+              <a:schemeClr val="lt1"/>
+            </a:fontRef>
+          </p:style>
+          <p:txBody>
+            <a:bodyPr rtlCol="0" anchor="ctr"/>
+            <a:lstStyle/>
+            <a:p>
+              <a:pPr algn="ctr"/>
+              <a:endParaRPr lang="en-US">
                 <a:solidFill>
                   <a:schemeClr val="tx1"/>
                 </a:solidFill>
-              </a:rPr>
-              <a:t>Feedback-Driven Mutation Testing Framework</a:t>
-            </a:r>
-          </a:p>
-        </p:txBody>
-      </p:sp>
-      <p:sp>
-        <p:nvSpPr>
-          <p:cNvPr id="5" name="Rectangle 4"/>
-          <p:cNvSpPr/>
-          <p:nvPr/>
-        </p:nvSpPr>
-        <p:spPr>
-          <a:xfrm>
-            <a:off x="4320737" y="2454208"/>
-            <a:ext cx="1844671" cy="1010866"/>
-          </a:xfrm>
-          <a:prstGeom prst="rect">
-            <a:avLst/>
-          </a:prstGeom>
-          <a:solidFill>
-            <a:schemeClr val="accent3">
-              <a:lumMod val="40000"/>
-              <a:lumOff val="60000"/>
-            </a:schemeClr>
-          </a:solidFill>
-        </p:spPr>
-        <p:style>
-          <a:lnRef idx="2">
-            <a:schemeClr val="accent1">
-              <a:shade val="50000"/>
-            </a:schemeClr>
-          </a:lnRef>
-          <a:fillRef idx="1">
-            <a:schemeClr val="accent1"/>
-          </a:fillRef>
-          <a:effectRef idx="0">
-            <a:schemeClr val="accent1"/>
-          </a:effectRef>
-          <a:fontRef idx="minor">
-            <a:schemeClr val="lt1"/>
-          </a:fontRef>
-        </p:style>
-        <p:txBody>
-          <a:bodyPr rtlCol="0" anchor="ctr"/>
-          <a:lstStyle/>
-          <a:p>
-            <a:pPr algn="ctr"/>
-            <a:r>
-              <a:rPr lang="en-US" dirty="0">
-                <a:solidFill>
-                  <a:schemeClr val="tx1"/>
-                </a:solidFill>
-              </a:rPr>
-              <a:t>Tests/Test Generator/</a:t>
-            </a:r>
-          </a:p>
-          <a:p>
-            <a:pPr algn="ctr"/>
-            <a:r>
-              <a:rPr lang="en-US" dirty="0">
-                <a:solidFill>
-                  <a:schemeClr val="tx1"/>
-                </a:solidFill>
-              </a:rPr>
-              <a:t>Verification Tool</a:t>
-            </a:r>
-          </a:p>
-        </p:txBody>
-      </p:sp>
-      <p:cxnSp>
-        <p:nvCxnSpPr>
-          <p:cNvPr id="26" name="Straight Arrow Connector 25"/>
-          <p:cNvCxnSpPr>
-            <a:cxnSpLocks/>
-            <a:endCxn id="36" idx="1"/>
-          </p:cNvCxnSpPr>
-          <p:nvPr/>
-        </p:nvCxnSpPr>
-        <p:spPr>
-          <a:xfrm>
-            <a:off x="3657600" y="1163022"/>
-            <a:ext cx="640913" cy="521336"/>
-          </a:xfrm>
-          <a:prstGeom prst="straightConnector1">
-            <a:avLst/>
-          </a:prstGeom>
-          <a:ln>
-            <a:headEnd type="triangle" w="lg" len="lg"/>
-            <a:tailEnd type="none"/>
-          </a:ln>
-        </p:spPr>
-        <p:style>
-          <a:lnRef idx="1">
-            <a:schemeClr val="accent1"/>
-          </a:lnRef>
-          <a:fillRef idx="0">
-            <a:schemeClr val="accent1"/>
-          </a:fillRef>
-          <a:effectRef idx="0">
-            <a:schemeClr val="accent1"/>
-          </a:effectRef>
-          <a:fontRef idx="minor">
-            <a:schemeClr val="tx1"/>
-          </a:fontRef>
-        </p:style>
-      </p:cxnSp>
-      <p:sp>
-        <p:nvSpPr>
-          <p:cNvPr id="32" name="TextBox 31"/>
-          <p:cNvSpPr txBox="1"/>
-          <p:nvPr/>
-        </p:nvSpPr>
-        <p:spPr>
-          <a:xfrm>
-            <a:off x="1590627" y="4595655"/>
-            <a:ext cx="2345449" cy="646331"/>
-          </a:xfrm>
-          <a:prstGeom prst="rect">
-            <a:avLst/>
-          </a:prstGeom>
-          <a:noFill/>
-        </p:spPr>
-        <p:txBody>
-          <a:bodyPr wrap="none" rtlCol="0">
-            <a:spAutoFit/>
-          </a:bodyPr>
-          <a:lstStyle/>
-          <a:p>
-            <a:pPr algn="ctr"/>
-            <a:r>
-              <a:rPr lang="en-US" dirty="0"/>
-              <a:t>Developer/verification</a:t>
-            </a:r>
-            <a:br>
-              <a:rPr lang="en-US" dirty="0"/>
-            </a:br>
-            <a:r>
-              <a:rPr lang="en-US" dirty="0"/>
-              <a:t>or test engineer</a:t>
-            </a:r>
-          </a:p>
-        </p:txBody>
-      </p:sp>
-      <p:pic>
-        <p:nvPicPr>
-          <p:cNvPr id="3" name="Picture 2"/>
-          <p:cNvPicPr>
-            <a:picLocks noChangeAspect="1"/>
-          </p:cNvPicPr>
-          <p:nvPr/>
-        </p:nvPicPr>
-        <p:blipFill>
-          <a:blip r:embed="rId2"/>
-          <a:stretch>
-            <a:fillRect/>
-          </a:stretch>
-        </p:blipFill>
-        <p:spPr>
-          <a:xfrm>
-            <a:off x="2246168" y="3678545"/>
-            <a:ext cx="838200" cy="916172"/>
-          </a:xfrm>
-          <a:prstGeom prst="rect">
-            <a:avLst/>
-          </a:prstGeom>
-        </p:spPr>
-      </p:pic>
-      <p:sp>
-        <p:nvSpPr>
-          <p:cNvPr id="36" name="Rectangle 35"/>
-          <p:cNvSpPr/>
-          <p:nvPr/>
-        </p:nvSpPr>
-        <p:spPr>
-          <a:xfrm>
-            <a:off x="4298513" y="1303358"/>
-            <a:ext cx="1851024" cy="762000"/>
-          </a:xfrm>
-          <a:prstGeom prst="rect">
-            <a:avLst/>
-          </a:prstGeom>
-          <a:solidFill>
-            <a:schemeClr val="accent3">
-              <a:lumMod val="40000"/>
-              <a:lumOff val="60000"/>
-            </a:schemeClr>
-          </a:solidFill>
-        </p:spPr>
-        <p:style>
-          <a:lnRef idx="2">
-            <a:schemeClr val="accent1">
-              <a:shade val="50000"/>
-            </a:schemeClr>
-          </a:lnRef>
-          <a:fillRef idx="1">
-            <a:schemeClr val="accent1"/>
-          </a:fillRef>
-          <a:effectRef idx="0">
-            <a:schemeClr val="accent1"/>
-          </a:effectRef>
-          <a:fontRef idx="minor">
-            <a:schemeClr val="lt1"/>
-          </a:fontRef>
-        </p:style>
-        <p:txBody>
-          <a:bodyPr rtlCol="0" anchor="ctr"/>
-          <a:lstStyle/>
-          <a:p>
-            <a:pPr algn="ctr"/>
-            <a:r>
-              <a:rPr lang="en-US" dirty="0">
-                <a:solidFill>
-                  <a:schemeClr val="tx1"/>
-                </a:solidFill>
-              </a:rPr>
-              <a:t>SUT Source</a:t>
-            </a:r>
-          </a:p>
-        </p:txBody>
-      </p:sp>
-      <p:cxnSp>
-        <p:nvCxnSpPr>
-          <p:cNvPr id="38" name="Straight Arrow Connector 37"/>
-          <p:cNvCxnSpPr>
-            <a:cxnSpLocks/>
-            <a:stCxn id="4" idx="2"/>
-            <a:endCxn id="5" idx="1"/>
-          </p:cNvCxnSpPr>
-          <p:nvPr/>
-        </p:nvCxnSpPr>
-        <p:spPr>
-          <a:xfrm>
-            <a:off x="2667000" y="1676400"/>
-            <a:ext cx="1653737" cy="1283241"/>
-          </a:xfrm>
-          <a:prstGeom prst="straightConnector1">
-            <a:avLst/>
-          </a:prstGeom>
-          <a:ln>
-            <a:headEnd type="triangle" w="lg" len="lg"/>
-            <a:tailEnd type="none"/>
-          </a:ln>
-        </p:spPr>
-        <p:style>
-          <a:lnRef idx="1">
-            <a:schemeClr val="accent1"/>
-          </a:lnRef>
-          <a:fillRef idx="0">
-            <a:schemeClr val="accent1"/>
-          </a:fillRef>
-          <a:effectRef idx="0">
-            <a:schemeClr val="accent1"/>
-          </a:effectRef>
-          <a:fontRef idx="minor">
-            <a:schemeClr val="tx1"/>
-          </a:fontRef>
-        </p:style>
-      </p:cxnSp>
-      <p:sp>
-        <p:nvSpPr>
-          <p:cNvPr id="51" name="Curved Left Arrow 50"/>
-          <p:cNvSpPr/>
-          <p:nvPr/>
-        </p:nvSpPr>
-        <p:spPr>
-          <a:xfrm flipH="1">
-            <a:off x="291956" y="685800"/>
-            <a:ext cx="1447800" cy="3886200"/>
-          </a:xfrm>
-          <a:prstGeom prst="curvedLeftArrow">
-            <a:avLst/>
-          </a:prstGeom>
-          <a:solidFill>
-            <a:schemeClr val="tx1">
-              <a:lumMod val="50000"/>
-              <a:lumOff val="50000"/>
-            </a:schemeClr>
-          </a:solidFill>
-        </p:spPr>
-        <p:style>
-          <a:lnRef idx="2">
-            <a:schemeClr val="accent1">
-              <a:shade val="50000"/>
-            </a:schemeClr>
-          </a:lnRef>
-          <a:fillRef idx="1">
-            <a:schemeClr val="accent1"/>
-          </a:fillRef>
-          <a:effectRef idx="0">
-            <a:schemeClr val="accent1"/>
-          </a:effectRef>
-          <a:fontRef idx="minor">
-            <a:schemeClr val="lt1"/>
-          </a:fontRef>
-        </p:style>
-        <p:txBody>
-          <a:bodyPr rtlCol="0" anchor="ctr"/>
-          <a:lstStyle/>
-          <a:p>
-            <a:pPr algn="ctr"/>
-            <a:endParaRPr lang="en-US">
-              <a:solidFill>
-                <a:schemeClr val="tx1"/>
-              </a:solidFill>
-            </a:endParaRPr>
-          </a:p>
-        </p:txBody>
-      </p:sp>
-      <p:cxnSp>
-        <p:nvCxnSpPr>
-          <p:cNvPr id="52" name="Straight Arrow Connector 51"/>
-          <p:cNvCxnSpPr>
-            <a:cxnSpLocks/>
-            <a:stCxn id="36" idx="1"/>
-            <a:endCxn id="3" idx="0"/>
-          </p:cNvCxnSpPr>
-          <p:nvPr/>
-        </p:nvCxnSpPr>
-        <p:spPr>
-          <a:xfrm flipH="1">
-            <a:off x="2665268" y="1684358"/>
-            <a:ext cx="1633245" cy="1994187"/>
-          </a:xfrm>
-          <a:prstGeom prst="straightConnector1">
-            <a:avLst/>
-          </a:prstGeom>
-          <a:ln>
-            <a:headEnd type="triangle" w="lg" len="lg"/>
-            <a:tailEnd type="none"/>
-          </a:ln>
-        </p:spPr>
-        <p:style>
-          <a:lnRef idx="1">
-            <a:schemeClr val="accent1"/>
-          </a:lnRef>
-          <a:fillRef idx="0">
-            <a:schemeClr val="accent1"/>
-          </a:fillRef>
-          <a:effectRef idx="0">
-            <a:schemeClr val="accent1"/>
-          </a:effectRef>
-          <a:fontRef idx="minor">
-            <a:schemeClr val="tx1"/>
-          </a:fontRef>
-        </p:style>
-      </p:cxnSp>
-      <p:cxnSp>
-        <p:nvCxnSpPr>
-          <p:cNvPr id="55" name="Straight Arrow Connector 54"/>
-          <p:cNvCxnSpPr>
-            <a:cxnSpLocks/>
-            <a:stCxn id="5" idx="1"/>
-            <a:endCxn id="3" idx="0"/>
-          </p:cNvCxnSpPr>
-          <p:nvPr/>
-        </p:nvCxnSpPr>
-        <p:spPr>
-          <a:xfrm flipH="1">
-            <a:off x="2665268" y="2959641"/>
-            <a:ext cx="1655469" cy="718904"/>
-          </a:xfrm>
-          <a:prstGeom prst="straightConnector1">
-            <a:avLst/>
-          </a:prstGeom>
-          <a:ln>
-            <a:headEnd type="triangle" w="lg" len="lg"/>
-            <a:tailEnd type="none"/>
-          </a:ln>
-        </p:spPr>
-        <p:style>
-          <a:lnRef idx="1">
-            <a:schemeClr val="accent1"/>
-          </a:lnRef>
-          <a:fillRef idx="0">
-            <a:schemeClr val="accent1"/>
-          </a:fillRef>
-          <a:effectRef idx="0">
-            <a:schemeClr val="accent1"/>
-          </a:effectRef>
-          <a:fontRef idx="minor">
-            <a:schemeClr val="tx1"/>
-          </a:fontRef>
-        </p:style>
-      </p:cxnSp>
-      <p:sp>
-        <p:nvSpPr>
-          <p:cNvPr id="58" name="TextBox 57"/>
-          <p:cNvSpPr txBox="1"/>
-          <p:nvPr/>
-        </p:nvSpPr>
-        <p:spPr>
-          <a:xfrm>
-            <a:off x="636778" y="1823755"/>
-            <a:ext cx="974819" cy="646331"/>
-          </a:xfrm>
-          <a:prstGeom prst="rect">
-            <a:avLst/>
-          </a:prstGeom>
-          <a:noFill/>
-        </p:spPr>
-        <p:txBody>
-          <a:bodyPr wrap="none" rtlCol="0">
-            <a:spAutoFit/>
-          </a:bodyPr>
-          <a:lstStyle/>
-          <a:p>
-            <a:pPr algn="ctr"/>
-            <a:r>
-              <a:rPr lang="en-US" dirty="0"/>
-              <a:t>Ranked</a:t>
-            </a:r>
-          </a:p>
-          <a:p>
-            <a:pPr algn="ctr"/>
-            <a:r>
-              <a:rPr lang="en-US" dirty="0"/>
-              <a:t>Mutants</a:t>
-            </a:r>
-          </a:p>
-        </p:txBody>
-      </p:sp>
-      <p:sp>
-        <p:nvSpPr>
-          <p:cNvPr id="104" name="Rectangle 103"/>
-          <p:cNvSpPr/>
-          <p:nvPr/>
-        </p:nvSpPr>
-        <p:spPr>
-          <a:xfrm>
-            <a:off x="6629400" y="3200400"/>
-            <a:ext cx="1676400" cy="914400"/>
-          </a:xfrm>
-          <a:prstGeom prst="rect">
-            <a:avLst/>
-          </a:prstGeom>
-          <a:solidFill>
-            <a:schemeClr val="accent1">
-              <a:lumMod val="20000"/>
-              <a:lumOff val="80000"/>
-            </a:schemeClr>
-          </a:solidFill>
-          <a:ln w="76200"/>
-        </p:spPr>
-        <p:style>
-          <a:lnRef idx="2">
-            <a:schemeClr val="accent1">
-              <a:shade val="50000"/>
-            </a:schemeClr>
-          </a:lnRef>
-          <a:fillRef idx="1">
-            <a:schemeClr val="accent1"/>
-          </a:fillRef>
-          <a:effectRef idx="0">
-            <a:schemeClr val="accent1"/>
-          </a:effectRef>
-          <a:fontRef idx="minor">
-            <a:schemeClr val="lt1"/>
-          </a:fontRef>
-        </p:style>
-        <p:txBody>
-          <a:bodyPr rtlCol="0" anchor="ctr"/>
-          <a:lstStyle/>
-          <a:p>
-            <a:pPr algn="ctr"/>
-            <a:r>
-              <a:rPr lang="en-US" b="1" dirty="0">
-                <a:solidFill>
-                  <a:schemeClr val="tx1"/>
-                </a:solidFill>
-              </a:rPr>
-              <a:t>Mutant Utility Predictor</a:t>
-            </a:r>
-          </a:p>
-        </p:txBody>
-      </p:sp>
-      <p:sp>
-        <p:nvSpPr>
-          <p:cNvPr id="121" name="Rectangle 120"/>
-          <p:cNvSpPr/>
-          <p:nvPr/>
-        </p:nvSpPr>
-        <p:spPr>
-          <a:xfrm>
-            <a:off x="6629400" y="762000"/>
-            <a:ext cx="1676400" cy="914400"/>
-          </a:xfrm>
-          <a:prstGeom prst="rect">
-            <a:avLst/>
-          </a:prstGeom>
-          <a:solidFill>
-            <a:schemeClr val="accent1">
-              <a:lumMod val="20000"/>
-              <a:lumOff val="80000"/>
-            </a:schemeClr>
-          </a:solidFill>
-          <a:ln w="76200"/>
-        </p:spPr>
-        <p:style>
-          <a:lnRef idx="2">
-            <a:schemeClr val="accent1">
-              <a:shade val="50000"/>
-            </a:schemeClr>
-          </a:lnRef>
-          <a:fillRef idx="1">
-            <a:schemeClr val="accent1"/>
-          </a:fillRef>
-          <a:effectRef idx="0">
-            <a:schemeClr val="accent1"/>
-          </a:effectRef>
-          <a:fontRef idx="minor">
-            <a:schemeClr val="lt1"/>
-          </a:fontRef>
-        </p:style>
-        <p:txBody>
-          <a:bodyPr rtlCol="0" anchor="ctr"/>
-          <a:lstStyle/>
-          <a:p>
-            <a:pPr algn="ctr"/>
-            <a:r>
-              <a:rPr lang="en-US" b="1" dirty="0">
-                <a:solidFill>
-                  <a:schemeClr val="tx1"/>
-                </a:solidFill>
-              </a:rPr>
-              <a:t>Mutant Generator</a:t>
-            </a:r>
-          </a:p>
-        </p:txBody>
-      </p:sp>
-      <p:sp>
-        <p:nvSpPr>
-          <p:cNvPr id="124" name="Rectangle 123"/>
-          <p:cNvSpPr/>
-          <p:nvPr/>
-        </p:nvSpPr>
-        <p:spPr>
-          <a:xfrm>
-            <a:off x="6629400" y="1981200"/>
-            <a:ext cx="1676400" cy="914400"/>
-          </a:xfrm>
-          <a:prstGeom prst="rect">
-            <a:avLst/>
-          </a:prstGeom>
-          <a:solidFill>
-            <a:schemeClr val="accent1">
-              <a:lumMod val="20000"/>
-              <a:lumOff val="80000"/>
-            </a:schemeClr>
-          </a:solidFill>
-          <a:ln w="76200"/>
-        </p:spPr>
-        <p:style>
-          <a:lnRef idx="2">
-            <a:schemeClr val="accent1">
-              <a:shade val="50000"/>
-            </a:schemeClr>
-          </a:lnRef>
-          <a:fillRef idx="1">
-            <a:schemeClr val="accent1"/>
-          </a:fillRef>
-          <a:effectRef idx="0">
-            <a:schemeClr val="accent1"/>
-          </a:effectRef>
-          <a:fontRef idx="minor">
-            <a:schemeClr val="lt1"/>
-          </a:fontRef>
-        </p:style>
-        <p:txBody>
-          <a:bodyPr rtlCol="0" anchor="ctr"/>
-          <a:lstStyle/>
-          <a:p>
-            <a:pPr algn="ctr"/>
-            <a:r>
-              <a:rPr lang="en-US" b="1" dirty="0">
-                <a:solidFill>
-                  <a:schemeClr val="tx1"/>
-                </a:solidFill>
-              </a:rPr>
-              <a:t>FPF-Based Novelty Ranking</a:t>
-            </a:r>
-          </a:p>
-        </p:txBody>
-      </p:sp>
-      <p:sp>
-        <p:nvSpPr>
-          <p:cNvPr id="129" name="Rectangle 128"/>
-          <p:cNvSpPr/>
-          <p:nvPr/>
-        </p:nvSpPr>
-        <p:spPr>
-          <a:xfrm>
-            <a:off x="6629400" y="4419600"/>
-            <a:ext cx="1676400" cy="914400"/>
-          </a:xfrm>
-          <a:prstGeom prst="rect">
-            <a:avLst/>
-          </a:prstGeom>
-          <a:solidFill>
-            <a:schemeClr val="accent1">
-              <a:lumMod val="20000"/>
-              <a:lumOff val="80000"/>
-            </a:schemeClr>
-          </a:solidFill>
-          <a:ln w="76200"/>
-        </p:spPr>
-        <p:style>
-          <a:lnRef idx="2">
-            <a:schemeClr val="accent1">
-              <a:shade val="50000"/>
-            </a:schemeClr>
-          </a:lnRef>
-          <a:fillRef idx="1">
-            <a:schemeClr val="accent1"/>
-          </a:fillRef>
-          <a:effectRef idx="0">
-            <a:schemeClr val="accent1"/>
-          </a:effectRef>
-          <a:fontRef idx="minor">
-            <a:schemeClr val="lt1"/>
-          </a:fontRef>
-        </p:style>
-        <p:txBody>
-          <a:bodyPr rtlCol="0" anchor="ctr"/>
-          <a:lstStyle/>
-          <a:p>
-            <a:pPr algn="ctr"/>
-            <a:r>
-              <a:rPr lang="en-US" b="1" dirty="0">
-                <a:solidFill>
-                  <a:schemeClr val="tx1"/>
-                </a:solidFill>
-              </a:rPr>
-              <a:t>Feedback Analysis</a:t>
-            </a:r>
-          </a:p>
-        </p:txBody>
-      </p:sp>
-      <p:cxnSp>
-        <p:nvCxnSpPr>
-          <p:cNvPr id="1051" name="Straight Connector 1050"/>
-          <p:cNvCxnSpPr>
-            <a:cxnSpLocks/>
-          </p:cNvCxnSpPr>
-          <p:nvPr/>
-        </p:nvCxnSpPr>
-        <p:spPr>
-          <a:xfrm>
-            <a:off x="8458200" y="685800"/>
-            <a:ext cx="76200" cy="4876800"/>
-          </a:xfrm>
-          <a:prstGeom prst="line">
-            <a:avLst/>
-          </a:prstGeom>
-        </p:spPr>
-        <p:style>
-          <a:lnRef idx="2">
-            <a:schemeClr val="accent1"/>
-          </a:lnRef>
-          <a:fillRef idx="0">
-            <a:schemeClr val="accent1"/>
-          </a:fillRef>
-          <a:effectRef idx="1">
-            <a:schemeClr val="accent1"/>
-          </a:effectRef>
-          <a:fontRef idx="minor">
-            <a:schemeClr val="tx1"/>
-          </a:fontRef>
-        </p:style>
-      </p:cxnSp>
-      <p:cxnSp>
-        <p:nvCxnSpPr>
-          <p:cNvPr id="1053" name="Straight Connector 1052"/>
-          <p:cNvCxnSpPr/>
-          <p:nvPr/>
-        </p:nvCxnSpPr>
-        <p:spPr>
-          <a:xfrm flipH="1">
-            <a:off x="8382000" y="685800"/>
-            <a:ext cx="76200" cy="0"/>
-          </a:xfrm>
-          <a:prstGeom prst="line">
-            <a:avLst/>
-          </a:prstGeom>
-        </p:spPr>
-        <p:style>
-          <a:lnRef idx="2">
-            <a:schemeClr val="accent1"/>
-          </a:lnRef>
-          <a:fillRef idx="0">
-            <a:schemeClr val="accent1"/>
-          </a:fillRef>
-          <a:effectRef idx="1">
-            <a:schemeClr val="accent1"/>
-          </a:effectRef>
-          <a:fontRef idx="minor">
-            <a:schemeClr val="tx1"/>
-          </a:fontRef>
-        </p:style>
-      </p:cxnSp>
-      <p:cxnSp>
-        <p:nvCxnSpPr>
-          <p:cNvPr id="134" name="Straight Connector 133"/>
-          <p:cNvCxnSpPr/>
-          <p:nvPr/>
-        </p:nvCxnSpPr>
-        <p:spPr>
-          <a:xfrm flipH="1">
-            <a:off x="8458200" y="5562600"/>
-            <a:ext cx="76200" cy="0"/>
-          </a:xfrm>
-          <a:prstGeom prst="line">
-            <a:avLst/>
-          </a:prstGeom>
-        </p:spPr>
-        <p:style>
-          <a:lnRef idx="2">
-            <a:schemeClr val="accent1"/>
-          </a:lnRef>
-          <a:fillRef idx="0">
-            <a:schemeClr val="accent1"/>
-          </a:fillRef>
-          <a:effectRef idx="1">
-            <a:schemeClr val="accent1"/>
-          </a:effectRef>
-          <a:fontRef idx="minor">
-            <a:schemeClr val="tx1"/>
-          </a:fontRef>
-        </p:style>
-      </p:cxnSp>
-      <p:sp>
-        <p:nvSpPr>
-          <p:cNvPr id="127" name="Freeform 126"/>
-          <p:cNvSpPr/>
-          <p:nvPr/>
-        </p:nvSpPr>
-        <p:spPr>
-          <a:xfrm>
-            <a:off x="5508625" y="281359"/>
-            <a:ext cx="3554614" cy="2687266"/>
-          </a:xfrm>
-          <a:custGeom>
-            <a:avLst/>
-            <a:gdLst>
-              <a:gd name="connsiteX0" fmla="*/ 3127375 w 3554614"/>
-              <a:gd name="connsiteY0" fmla="*/ 2687266 h 2687266"/>
-              <a:gd name="connsiteX1" fmla="*/ 3286125 w 3554614"/>
-              <a:gd name="connsiteY1" fmla="*/ 226641 h 2687266"/>
-              <a:gd name="connsiteX2" fmla="*/ 0 w 3554614"/>
-              <a:gd name="connsiteY2" fmla="*/ 258391 h 2687266"/>
-            </a:gdLst>
-            <a:ahLst/>
-            <a:cxnLst>
-              <a:cxn ang="0">
-                <a:pos x="connsiteX0" y="connsiteY0"/>
-              </a:cxn>
-              <a:cxn ang="0">
-                <a:pos x="connsiteX1" y="connsiteY1"/>
-              </a:cxn>
-              <a:cxn ang="0">
-                <a:pos x="connsiteX2" y="connsiteY2"/>
-              </a:cxn>
-            </a:cxnLst>
-            <a:rect l="l" t="t" r="r" b="b"/>
-            <a:pathLst>
-              <a:path w="3554614" h="2687266">
-                <a:moveTo>
-                  <a:pt x="3127375" y="2687266"/>
-                </a:moveTo>
-                <a:cubicBezTo>
-                  <a:pt x="3467364" y="1659359"/>
-                  <a:pt x="3807354" y="631453"/>
-                  <a:pt x="3286125" y="226641"/>
-                </a:cubicBezTo>
-                <a:cubicBezTo>
-                  <a:pt x="2764896" y="-178171"/>
-                  <a:pt x="1382448" y="40110"/>
-                  <a:pt x="0" y="258391"/>
-                </a:cubicBezTo>
-              </a:path>
-            </a:pathLst>
-          </a:custGeom>
-          <a:ln>
-            <a:headEnd type="triangle" w="lg" len="lg"/>
-          </a:ln>
-        </p:spPr>
-        <p:style>
-          <a:lnRef idx="2">
-            <a:schemeClr val="accent1"/>
-          </a:lnRef>
-          <a:fillRef idx="0">
-            <a:schemeClr val="accent1"/>
-          </a:fillRef>
-          <a:effectRef idx="1">
-            <a:schemeClr val="accent1"/>
-          </a:effectRef>
-          <a:fontRef idx="minor">
-            <a:schemeClr val="tx1"/>
-          </a:fontRef>
-        </p:style>
-        <p:txBody>
-          <a:bodyPr rtlCol="0" anchor="ctr"/>
-          <a:lstStyle/>
-          <a:p>
-            <a:pPr algn="ctr"/>
-            <a:endParaRPr lang="en-US"/>
-          </a:p>
-        </p:txBody>
-      </p:sp>
-      <p:cxnSp>
-        <p:nvCxnSpPr>
-          <p:cNvPr id="133" name="Straight Arrow Connector 132"/>
-          <p:cNvCxnSpPr>
-            <a:stCxn id="127" idx="2"/>
-          </p:cNvCxnSpPr>
-          <p:nvPr/>
-        </p:nvCxnSpPr>
-        <p:spPr>
-          <a:xfrm flipH="1">
-            <a:off x="3657600" y="539750"/>
-            <a:ext cx="1851025" cy="527050"/>
-          </a:xfrm>
-          <a:prstGeom prst="straightConnector1">
-            <a:avLst/>
-          </a:prstGeom>
-          <a:ln>
-            <a:tailEnd type="arrow"/>
-          </a:ln>
-        </p:spPr>
-        <p:style>
-          <a:lnRef idx="2">
-            <a:schemeClr val="accent1"/>
-          </a:lnRef>
-          <a:fillRef idx="0">
-            <a:schemeClr val="accent1"/>
-          </a:fillRef>
-          <a:effectRef idx="1">
-            <a:schemeClr val="accent1"/>
-          </a:effectRef>
-          <a:fontRef idx="minor">
-            <a:schemeClr val="tx1"/>
-          </a:fontRef>
-        </p:style>
-      </p:cxnSp>
-      <p:sp>
-        <p:nvSpPr>
-          <p:cNvPr id="1065" name="TextBox 1064"/>
-          <p:cNvSpPr txBox="1"/>
-          <p:nvPr/>
-        </p:nvSpPr>
-        <p:spPr>
-          <a:xfrm>
-            <a:off x="871392" y="3025980"/>
-            <a:ext cx="1151084" cy="646331"/>
-          </a:xfrm>
-          <a:prstGeom prst="rect">
-            <a:avLst/>
-          </a:prstGeom>
-          <a:noFill/>
-        </p:spPr>
-        <p:txBody>
-          <a:bodyPr wrap="none" rtlCol="0">
-            <a:spAutoFit/>
-          </a:bodyPr>
-          <a:lstStyle/>
-          <a:p>
-            <a:pPr algn="ctr"/>
-            <a:r>
-              <a:rPr lang="en-US" dirty="0"/>
-              <a:t>Developer</a:t>
-            </a:r>
-          </a:p>
-          <a:p>
-            <a:pPr algn="ctr"/>
-            <a:r>
-              <a:rPr lang="en-US" dirty="0"/>
-              <a:t>Feedback</a:t>
-            </a:r>
-          </a:p>
-        </p:txBody>
-      </p:sp>
-      <p:cxnSp>
-        <p:nvCxnSpPr>
-          <p:cNvPr id="39" name="Straight Arrow Connector 38">
-            <a:extLst>
-              <a:ext uri="{FF2B5EF4-FFF2-40B4-BE49-F238E27FC236}">
-                <a16:creationId xmlns:a16="http://schemas.microsoft.com/office/drawing/2014/main" id="{CFB521AA-0B49-3246-97CF-0B702B261742}"/>
-              </a:ext>
-            </a:extLst>
-          </p:cNvPr>
-          <p:cNvCxnSpPr>
-            <a:cxnSpLocks/>
-          </p:cNvCxnSpPr>
-          <p:nvPr/>
-        </p:nvCxnSpPr>
-        <p:spPr>
-          <a:xfrm flipH="1">
-            <a:off x="1963881" y="1742248"/>
-            <a:ext cx="55419" cy="2377440"/>
-          </a:xfrm>
-          <a:prstGeom prst="straightConnector1">
-            <a:avLst/>
-          </a:prstGeom>
-          <a:ln>
-            <a:headEnd type="triangle" w="lg" len="lg"/>
-            <a:tailEnd type="none"/>
-          </a:ln>
-        </p:spPr>
-        <p:style>
-          <a:lnRef idx="1">
-            <a:schemeClr val="accent1"/>
-          </a:lnRef>
-          <a:fillRef idx="0">
-            <a:schemeClr val="accent1"/>
-          </a:fillRef>
-          <a:effectRef idx="0">
-            <a:schemeClr val="accent1"/>
-          </a:effectRef>
-          <a:fontRef idx="minor">
-            <a:schemeClr val="tx1"/>
-          </a:fontRef>
-        </p:style>
-      </p:cxnSp>
-      <p:sp>
-        <p:nvSpPr>
-          <p:cNvPr id="57" name="TextBox 56">
-            <a:extLst>
-              <a:ext uri="{FF2B5EF4-FFF2-40B4-BE49-F238E27FC236}">
-                <a16:creationId xmlns:a16="http://schemas.microsoft.com/office/drawing/2014/main" id="{D14A93D1-FFD1-CF47-8D1F-A6605D825986}"/>
-              </a:ext>
-            </a:extLst>
-          </p:cNvPr>
-          <p:cNvSpPr txBox="1"/>
-          <p:nvPr/>
-        </p:nvSpPr>
-        <p:spPr>
-          <a:xfrm>
-            <a:off x="2071855" y="2677397"/>
-            <a:ext cx="1413320" cy="369332"/>
-          </a:xfrm>
-          <a:prstGeom prst="rect">
-            <a:avLst/>
-          </a:prstGeom>
-          <a:noFill/>
-        </p:spPr>
-        <p:txBody>
-          <a:bodyPr wrap="square" rtlCol="0">
-            <a:spAutoFit/>
-          </a:bodyPr>
-          <a:lstStyle/>
-          <a:p>
-            <a:pPr algn="ctr"/>
-            <a:r>
-              <a:rPr lang="en-US" dirty="0"/>
-              <a:t>Fixes to SUT</a:t>
-            </a:r>
-          </a:p>
-        </p:txBody>
-      </p:sp>
-      <p:sp>
-        <p:nvSpPr>
-          <p:cNvPr id="59" name="TextBox 58">
-            <a:extLst>
-              <a:ext uri="{FF2B5EF4-FFF2-40B4-BE49-F238E27FC236}">
-                <a16:creationId xmlns:a16="http://schemas.microsoft.com/office/drawing/2014/main" id="{5014F895-D911-C741-91C0-2F9692BA8446}"/>
-              </a:ext>
-            </a:extLst>
-          </p:cNvPr>
-          <p:cNvSpPr txBox="1"/>
-          <p:nvPr/>
-        </p:nvSpPr>
-        <p:spPr>
-          <a:xfrm>
-            <a:off x="2870664" y="3531551"/>
-            <a:ext cx="1599156" cy="369332"/>
-          </a:xfrm>
-          <a:prstGeom prst="rect">
-            <a:avLst/>
-          </a:prstGeom>
-          <a:noFill/>
-        </p:spPr>
-        <p:txBody>
-          <a:bodyPr wrap="none" rtlCol="0">
-            <a:spAutoFit/>
-          </a:bodyPr>
-          <a:lstStyle/>
-          <a:p>
-            <a:pPr algn="ctr"/>
-            <a:r>
-              <a:rPr lang="en-US" dirty="0"/>
-              <a:t>Fixes to Testing</a:t>
-            </a:r>
-          </a:p>
-        </p:txBody>
-      </p:sp>
+              </a:endParaRPr>
+            </a:p>
+          </p:txBody>
+        </p:sp>
+        <p:cxnSp>
+          <p:nvCxnSpPr>
+            <p:cNvPr id="52" name="Straight Arrow Connector 51"/>
+            <p:cNvCxnSpPr>
+              <a:cxnSpLocks/>
+              <a:stCxn id="36" idx="1"/>
+              <a:endCxn id="3" idx="0"/>
+            </p:cNvCxnSpPr>
+            <p:nvPr/>
+          </p:nvCxnSpPr>
+          <p:spPr>
+            <a:xfrm flipH="1">
+              <a:off x="2665268" y="1684358"/>
+              <a:ext cx="1633245" cy="1994187"/>
+            </a:xfrm>
+            <a:prstGeom prst="straightConnector1">
+              <a:avLst/>
+            </a:prstGeom>
+            <a:ln>
+              <a:headEnd type="triangle" w="lg" len="lg"/>
+              <a:tailEnd type="none"/>
+            </a:ln>
+          </p:spPr>
+          <p:style>
+            <a:lnRef idx="1">
+              <a:schemeClr val="accent1"/>
+            </a:lnRef>
+            <a:fillRef idx="0">
+              <a:schemeClr val="accent1"/>
+            </a:fillRef>
+            <a:effectRef idx="0">
+              <a:schemeClr val="accent1"/>
+            </a:effectRef>
+            <a:fontRef idx="minor">
+              <a:schemeClr val="tx1"/>
+            </a:fontRef>
+          </p:style>
+        </p:cxnSp>
+        <p:cxnSp>
+          <p:nvCxnSpPr>
+            <p:cNvPr id="55" name="Straight Arrow Connector 54"/>
+            <p:cNvCxnSpPr>
+              <a:cxnSpLocks/>
+              <a:stCxn id="5" idx="1"/>
+              <a:endCxn id="3" idx="0"/>
+            </p:cNvCxnSpPr>
+            <p:nvPr/>
+          </p:nvCxnSpPr>
+          <p:spPr>
+            <a:xfrm flipH="1">
+              <a:off x="2665268" y="2959641"/>
+              <a:ext cx="1655469" cy="718904"/>
+            </a:xfrm>
+            <a:prstGeom prst="straightConnector1">
+              <a:avLst/>
+            </a:prstGeom>
+            <a:ln>
+              <a:headEnd type="triangle" w="lg" len="lg"/>
+              <a:tailEnd type="none"/>
+            </a:ln>
+          </p:spPr>
+          <p:style>
+            <a:lnRef idx="1">
+              <a:schemeClr val="accent1"/>
+            </a:lnRef>
+            <a:fillRef idx="0">
+              <a:schemeClr val="accent1"/>
+            </a:fillRef>
+            <a:effectRef idx="0">
+              <a:schemeClr val="accent1"/>
+            </a:effectRef>
+            <a:fontRef idx="minor">
+              <a:schemeClr val="tx1"/>
+            </a:fontRef>
+          </p:style>
+        </p:cxnSp>
+        <p:sp>
+          <p:nvSpPr>
+            <p:cNvPr id="58" name="TextBox 57"/>
+            <p:cNvSpPr txBox="1"/>
+            <p:nvPr/>
+          </p:nvSpPr>
+          <p:spPr>
+            <a:xfrm>
+              <a:off x="636778" y="1823755"/>
+              <a:ext cx="974819" cy="646331"/>
+            </a:xfrm>
+            <a:prstGeom prst="rect">
+              <a:avLst/>
+            </a:prstGeom>
+            <a:noFill/>
+          </p:spPr>
+          <p:txBody>
+            <a:bodyPr wrap="none" rtlCol="0">
+              <a:spAutoFit/>
+            </a:bodyPr>
+            <a:lstStyle/>
+            <a:p>
+              <a:pPr algn="ctr"/>
+              <a:r>
+                <a:rPr lang="en-US" dirty="0"/>
+                <a:t>Ranked</a:t>
+              </a:r>
+            </a:p>
+            <a:p>
+              <a:pPr algn="ctr"/>
+              <a:r>
+                <a:rPr lang="en-US" dirty="0"/>
+                <a:t>Mutants</a:t>
+              </a:r>
+            </a:p>
+          </p:txBody>
+        </p:sp>
+        <p:sp>
+          <p:nvSpPr>
+            <p:cNvPr id="104" name="Rectangle 103"/>
+            <p:cNvSpPr/>
+            <p:nvPr/>
+          </p:nvSpPr>
+          <p:spPr>
+            <a:xfrm>
+              <a:off x="6629400" y="3200400"/>
+              <a:ext cx="1676400" cy="914400"/>
+            </a:xfrm>
+            <a:prstGeom prst="rect">
+              <a:avLst/>
+            </a:prstGeom>
+            <a:solidFill>
+              <a:schemeClr val="accent1">
+                <a:lumMod val="20000"/>
+                <a:lumOff val="80000"/>
+              </a:schemeClr>
+            </a:solidFill>
+            <a:ln w="76200"/>
+          </p:spPr>
+          <p:style>
+            <a:lnRef idx="2">
+              <a:schemeClr val="accent1">
+                <a:shade val="50000"/>
+              </a:schemeClr>
+            </a:lnRef>
+            <a:fillRef idx="1">
+              <a:schemeClr val="accent1"/>
+            </a:fillRef>
+            <a:effectRef idx="0">
+              <a:schemeClr val="accent1"/>
+            </a:effectRef>
+            <a:fontRef idx="minor">
+              <a:schemeClr val="lt1"/>
+            </a:fontRef>
+          </p:style>
+          <p:txBody>
+            <a:bodyPr rtlCol="0" anchor="ctr"/>
+            <a:lstStyle/>
+            <a:p>
+              <a:pPr algn="ctr"/>
+              <a:r>
+                <a:rPr lang="en-US" b="1" dirty="0">
+                  <a:solidFill>
+                    <a:schemeClr val="tx1"/>
+                  </a:solidFill>
+                </a:rPr>
+                <a:t>Mutant Utility Predictor</a:t>
+              </a:r>
+            </a:p>
+          </p:txBody>
+        </p:sp>
+        <p:sp>
+          <p:nvSpPr>
+            <p:cNvPr id="121" name="Rectangle 120"/>
+            <p:cNvSpPr/>
+            <p:nvPr/>
+          </p:nvSpPr>
+          <p:spPr>
+            <a:xfrm>
+              <a:off x="6629400" y="762000"/>
+              <a:ext cx="1676400" cy="914400"/>
+            </a:xfrm>
+            <a:prstGeom prst="rect">
+              <a:avLst/>
+            </a:prstGeom>
+            <a:solidFill>
+              <a:schemeClr val="accent1">
+                <a:lumMod val="20000"/>
+                <a:lumOff val="80000"/>
+              </a:schemeClr>
+            </a:solidFill>
+            <a:ln w="76200"/>
+          </p:spPr>
+          <p:style>
+            <a:lnRef idx="2">
+              <a:schemeClr val="accent1">
+                <a:shade val="50000"/>
+              </a:schemeClr>
+            </a:lnRef>
+            <a:fillRef idx="1">
+              <a:schemeClr val="accent1"/>
+            </a:fillRef>
+            <a:effectRef idx="0">
+              <a:schemeClr val="accent1"/>
+            </a:effectRef>
+            <a:fontRef idx="minor">
+              <a:schemeClr val="lt1"/>
+            </a:fontRef>
+          </p:style>
+          <p:txBody>
+            <a:bodyPr rtlCol="0" anchor="ctr"/>
+            <a:lstStyle/>
+            <a:p>
+              <a:pPr algn="ctr"/>
+              <a:r>
+                <a:rPr lang="en-US" b="1" dirty="0">
+                  <a:solidFill>
+                    <a:schemeClr val="tx1"/>
+                  </a:solidFill>
+                </a:rPr>
+                <a:t>Mutant Generator</a:t>
+              </a:r>
+            </a:p>
+          </p:txBody>
+        </p:sp>
+        <p:sp>
+          <p:nvSpPr>
+            <p:cNvPr id="124" name="Rectangle 123"/>
+            <p:cNvSpPr/>
+            <p:nvPr/>
+          </p:nvSpPr>
+          <p:spPr>
+            <a:xfrm>
+              <a:off x="6629400" y="1981200"/>
+              <a:ext cx="1676400" cy="914400"/>
+            </a:xfrm>
+            <a:prstGeom prst="rect">
+              <a:avLst/>
+            </a:prstGeom>
+            <a:solidFill>
+              <a:schemeClr val="accent1">
+                <a:lumMod val="20000"/>
+                <a:lumOff val="80000"/>
+              </a:schemeClr>
+            </a:solidFill>
+            <a:ln w="76200"/>
+          </p:spPr>
+          <p:style>
+            <a:lnRef idx="2">
+              <a:schemeClr val="accent1">
+                <a:shade val="50000"/>
+              </a:schemeClr>
+            </a:lnRef>
+            <a:fillRef idx="1">
+              <a:schemeClr val="accent1"/>
+            </a:fillRef>
+            <a:effectRef idx="0">
+              <a:schemeClr val="accent1"/>
+            </a:effectRef>
+            <a:fontRef idx="minor">
+              <a:schemeClr val="lt1"/>
+            </a:fontRef>
+          </p:style>
+          <p:txBody>
+            <a:bodyPr rtlCol="0" anchor="ctr"/>
+            <a:lstStyle/>
+            <a:p>
+              <a:pPr algn="ctr"/>
+              <a:r>
+                <a:rPr lang="en-US" b="1" dirty="0">
+                  <a:solidFill>
+                    <a:schemeClr val="tx1"/>
+                  </a:solidFill>
+                </a:rPr>
+                <a:t>FPF-Based Novelty Ranking</a:t>
+              </a:r>
+            </a:p>
+          </p:txBody>
+        </p:sp>
+        <p:sp>
+          <p:nvSpPr>
+            <p:cNvPr id="129" name="Rectangle 128"/>
+            <p:cNvSpPr/>
+            <p:nvPr/>
+          </p:nvSpPr>
+          <p:spPr>
+            <a:xfrm>
+              <a:off x="6629400" y="4419600"/>
+              <a:ext cx="1676400" cy="914400"/>
+            </a:xfrm>
+            <a:prstGeom prst="rect">
+              <a:avLst/>
+            </a:prstGeom>
+            <a:solidFill>
+              <a:schemeClr val="accent1">
+                <a:lumMod val="20000"/>
+                <a:lumOff val="80000"/>
+              </a:schemeClr>
+            </a:solidFill>
+            <a:ln w="76200"/>
+          </p:spPr>
+          <p:style>
+            <a:lnRef idx="2">
+              <a:schemeClr val="accent1">
+                <a:shade val="50000"/>
+              </a:schemeClr>
+            </a:lnRef>
+            <a:fillRef idx="1">
+              <a:schemeClr val="accent1"/>
+            </a:fillRef>
+            <a:effectRef idx="0">
+              <a:schemeClr val="accent1"/>
+            </a:effectRef>
+            <a:fontRef idx="minor">
+              <a:schemeClr val="lt1"/>
+            </a:fontRef>
+          </p:style>
+          <p:txBody>
+            <a:bodyPr rtlCol="0" anchor="ctr"/>
+            <a:lstStyle/>
+            <a:p>
+              <a:pPr algn="ctr"/>
+              <a:r>
+                <a:rPr lang="en-US" b="1" dirty="0">
+                  <a:solidFill>
+                    <a:schemeClr val="tx1"/>
+                  </a:solidFill>
+                </a:rPr>
+                <a:t>Feedback Analysis</a:t>
+              </a:r>
+            </a:p>
+          </p:txBody>
+        </p:sp>
+        <p:cxnSp>
+          <p:nvCxnSpPr>
+            <p:cNvPr id="1051" name="Straight Connector 1050"/>
+            <p:cNvCxnSpPr>
+              <a:cxnSpLocks/>
+            </p:cNvCxnSpPr>
+            <p:nvPr/>
+          </p:nvCxnSpPr>
+          <p:spPr>
+            <a:xfrm>
+              <a:off x="8458200" y="685800"/>
+              <a:ext cx="76200" cy="4876800"/>
+            </a:xfrm>
+            <a:prstGeom prst="line">
+              <a:avLst/>
+            </a:prstGeom>
+          </p:spPr>
+          <p:style>
+            <a:lnRef idx="2">
+              <a:schemeClr val="accent1"/>
+            </a:lnRef>
+            <a:fillRef idx="0">
+              <a:schemeClr val="accent1"/>
+            </a:fillRef>
+            <a:effectRef idx="1">
+              <a:schemeClr val="accent1"/>
+            </a:effectRef>
+            <a:fontRef idx="minor">
+              <a:schemeClr val="tx1"/>
+            </a:fontRef>
+          </p:style>
+        </p:cxnSp>
+        <p:cxnSp>
+          <p:nvCxnSpPr>
+            <p:cNvPr id="1053" name="Straight Connector 1052"/>
+            <p:cNvCxnSpPr/>
+            <p:nvPr/>
+          </p:nvCxnSpPr>
+          <p:spPr>
+            <a:xfrm flipH="1">
+              <a:off x="8382000" y="685800"/>
+              <a:ext cx="76200" cy="0"/>
+            </a:xfrm>
+            <a:prstGeom prst="line">
+              <a:avLst/>
+            </a:prstGeom>
+          </p:spPr>
+          <p:style>
+            <a:lnRef idx="2">
+              <a:schemeClr val="accent1"/>
+            </a:lnRef>
+            <a:fillRef idx="0">
+              <a:schemeClr val="accent1"/>
+            </a:fillRef>
+            <a:effectRef idx="1">
+              <a:schemeClr val="accent1"/>
+            </a:effectRef>
+            <a:fontRef idx="minor">
+              <a:schemeClr val="tx1"/>
+            </a:fontRef>
+          </p:style>
+        </p:cxnSp>
+        <p:cxnSp>
+          <p:nvCxnSpPr>
+            <p:cNvPr id="134" name="Straight Connector 133"/>
+            <p:cNvCxnSpPr/>
+            <p:nvPr/>
+          </p:nvCxnSpPr>
+          <p:spPr>
+            <a:xfrm flipH="1">
+              <a:off x="8458200" y="5562600"/>
+              <a:ext cx="76200" cy="0"/>
+            </a:xfrm>
+            <a:prstGeom prst="line">
+              <a:avLst/>
+            </a:prstGeom>
+          </p:spPr>
+          <p:style>
+            <a:lnRef idx="2">
+              <a:schemeClr val="accent1"/>
+            </a:lnRef>
+            <a:fillRef idx="0">
+              <a:schemeClr val="accent1"/>
+            </a:fillRef>
+            <a:effectRef idx="1">
+              <a:schemeClr val="accent1"/>
+            </a:effectRef>
+            <a:fontRef idx="minor">
+              <a:schemeClr val="tx1"/>
+            </a:fontRef>
+          </p:style>
+        </p:cxnSp>
+        <p:sp>
+          <p:nvSpPr>
+            <p:cNvPr id="127" name="Freeform 126"/>
+            <p:cNvSpPr/>
+            <p:nvPr/>
+          </p:nvSpPr>
+          <p:spPr>
+            <a:xfrm>
+              <a:off x="5508625" y="281359"/>
+              <a:ext cx="3554614" cy="2687266"/>
+            </a:xfrm>
+            <a:custGeom>
+              <a:avLst/>
+              <a:gdLst>
+                <a:gd name="connsiteX0" fmla="*/ 3127375 w 3554614"/>
+                <a:gd name="connsiteY0" fmla="*/ 2687266 h 2687266"/>
+                <a:gd name="connsiteX1" fmla="*/ 3286125 w 3554614"/>
+                <a:gd name="connsiteY1" fmla="*/ 226641 h 2687266"/>
+                <a:gd name="connsiteX2" fmla="*/ 0 w 3554614"/>
+                <a:gd name="connsiteY2" fmla="*/ 258391 h 2687266"/>
+              </a:gdLst>
+              <a:ahLst/>
+              <a:cxnLst>
+                <a:cxn ang="0">
+                  <a:pos x="connsiteX0" y="connsiteY0"/>
+                </a:cxn>
+                <a:cxn ang="0">
+                  <a:pos x="connsiteX1" y="connsiteY1"/>
+                </a:cxn>
+                <a:cxn ang="0">
+                  <a:pos x="connsiteX2" y="connsiteY2"/>
+                </a:cxn>
+              </a:cxnLst>
+              <a:rect l="l" t="t" r="r" b="b"/>
+              <a:pathLst>
+                <a:path w="3554614" h="2687266">
+                  <a:moveTo>
+                    <a:pt x="3127375" y="2687266"/>
+                  </a:moveTo>
+                  <a:cubicBezTo>
+                    <a:pt x="3467364" y="1659359"/>
+                    <a:pt x="3807354" y="631453"/>
+                    <a:pt x="3286125" y="226641"/>
+                  </a:cubicBezTo>
+                  <a:cubicBezTo>
+                    <a:pt x="2764896" y="-178171"/>
+                    <a:pt x="1382448" y="40110"/>
+                    <a:pt x="0" y="258391"/>
+                  </a:cubicBezTo>
+                </a:path>
+              </a:pathLst>
+            </a:custGeom>
+            <a:ln>
+              <a:headEnd type="triangle" w="lg" len="lg"/>
+            </a:ln>
+          </p:spPr>
+          <p:style>
+            <a:lnRef idx="2">
+              <a:schemeClr val="accent1"/>
+            </a:lnRef>
+            <a:fillRef idx="0">
+              <a:schemeClr val="accent1"/>
+            </a:fillRef>
+            <a:effectRef idx="1">
+              <a:schemeClr val="accent1"/>
+            </a:effectRef>
+            <a:fontRef idx="minor">
+              <a:schemeClr val="tx1"/>
+            </a:fontRef>
+          </p:style>
+          <p:txBody>
+            <a:bodyPr rtlCol="0" anchor="ctr"/>
+            <a:lstStyle/>
+            <a:p>
+              <a:pPr algn="ctr"/>
+              <a:endParaRPr lang="en-US"/>
+            </a:p>
+          </p:txBody>
+        </p:sp>
+        <p:cxnSp>
+          <p:nvCxnSpPr>
+            <p:cNvPr id="133" name="Straight Arrow Connector 132"/>
+            <p:cNvCxnSpPr>
+              <a:stCxn id="127" idx="2"/>
+            </p:cNvCxnSpPr>
+            <p:nvPr/>
+          </p:nvCxnSpPr>
+          <p:spPr>
+            <a:xfrm flipH="1">
+              <a:off x="3657600" y="539750"/>
+              <a:ext cx="1851025" cy="527050"/>
+            </a:xfrm>
+            <a:prstGeom prst="straightConnector1">
+              <a:avLst/>
+            </a:prstGeom>
+            <a:ln>
+              <a:tailEnd type="arrow"/>
+            </a:ln>
+          </p:spPr>
+          <p:style>
+            <a:lnRef idx="2">
+              <a:schemeClr val="accent1"/>
+            </a:lnRef>
+            <a:fillRef idx="0">
+              <a:schemeClr val="accent1"/>
+            </a:fillRef>
+            <a:effectRef idx="1">
+              <a:schemeClr val="accent1"/>
+            </a:effectRef>
+            <a:fontRef idx="minor">
+              <a:schemeClr val="tx1"/>
+            </a:fontRef>
+          </p:style>
+        </p:cxnSp>
+        <p:sp>
+          <p:nvSpPr>
+            <p:cNvPr id="1065" name="TextBox 1064"/>
+            <p:cNvSpPr txBox="1"/>
+            <p:nvPr/>
+          </p:nvSpPr>
+          <p:spPr>
+            <a:xfrm>
+              <a:off x="871392" y="3025980"/>
+              <a:ext cx="1151084" cy="646331"/>
+            </a:xfrm>
+            <a:prstGeom prst="rect">
+              <a:avLst/>
+            </a:prstGeom>
+            <a:noFill/>
+          </p:spPr>
+          <p:txBody>
+            <a:bodyPr wrap="none" rtlCol="0">
+              <a:spAutoFit/>
+            </a:bodyPr>
+            <a:lstStyle/>
+            <a:p>
+              <a:pPr algn="ctr"/>
+              <a:r>
+                <a:rPr lang="en-US" dirty="0"/>
+                <a:t>Developer</a:t>
+              </a:r>
+            </a:p>
+            <a:p>
+              <a:pPr algn="ctr"/>
+              <a:r>
+                <a:rPr lang="en-US" dirty="0"/>
+                <a:t>Feedback</a:t>
+              </a:r>
+            </a:p>
+          </p:txBody>
+        </p:sp>
+        <p:cxnSp>
+          <p:nvCxnSpPr>
+            <p:cNvPr id="39" name="Straight Arrow Connector 38">
+              <a:extLst>
+                <a:ext uri="{FF2B5EF4-FFF2-40B4-BE49-F238E27FC236}">
+                  <a16:creationId xmlns:a16="http://schemas.microsoft.com/office/drawing/2014/main" id="{CFB521AA-0B49-3246-97CF-0B702B261742}"/>
+                </a:ext>
+              </a:extLst>
+            </p:cNvPr>
+            <p:cNvCxnSpPr>
+              <a:cxnSpLocks/>
+            </p:cNvCxnSpPr>
+            <p:nvPr/>
+          </p:nvCxnSpPr>
+          <p:spPr>
+            <a:xfrm flipH="1">
+              <a:off x="1963881" y="1742248"/>
+              <a:ext cx="55419" cy="2377440"/>
+            </a:xfrm>
+            <a:prstGeom prst="straightConnector1">
+              <a:avLst/>
+            </a:prstGeom>
+            <a:ln>
+              <a:headEnd type="triangle" w="lg" len="lg"/>
+              <a:tailEnd type="none"/>
+            </a:ln>
+          </p:spPr>
+          <p:style>
+            <a:lnRef idx="1">
+              <a:schemeClr val="accent1"/>
+            </a:lnRef>
+            <a:fillRef idx="0">
+              <a:schemeClr val="accent1"/>
+            </a:fillRef>
+            <a:effectRef idx="0">
+              <a:schemeClr val="accent1"/>
+            </a:effectRef>
+            <a:fontRef idx="minor">
+              <a:schemeClr val="tx1"/>
+            </a:fontRef>
+          </p:style>
+        </p:cxnSp>
+        <p:sp>
+          <p:nvSpPr>
+            <p:cNvPr id="57" name="TextBox 56">
+              <a:extLst>
+                <a:ext uri="{FF2B5EF4-FFF2-40B4-BE49-F238E27FC236}">
+                  <a16:creationId xmlns:a16="http://schemas.microsoft.com/office/drawing/2014/main" id="{D14A93D1-FFD1-CF47-8D1F-A6605D825986}"/>
+                </a:ext>
+              </a:extLst>
+            </p:cNvPr>
+            <p:cNvSpPr txBox="1"/>
+            <p:nvPr/>
+          </p:nvSpPr>
+          <p:spPr>
+            <a:xfrm>
+              <a:off x="2071855" y="2677397"/>
+              <a:ext cx="1413320" cy="369332"/>
+            </a:xfrm>
+            <a:prstGeom prst="rect">
+              <a:avLst/>
+            </a:prstGeom>
+            <a:noFill/>
+          </p:spPr>
+          <p:txBody>
+            <a:bodyPr wrap="square" rtlCol="0">
+              <a:spAutoFit/>
+            </a:bodyPr>
+            <a:lstStyle/>
+            <a:p>
+              <a:pPr algn="ctr"/>
+              <a:r>
+                <a:rPr lang="en-US" dirty="0"/>
+                <a:t>Fixes to SUT</a:t>
+              </a:r>
+            </a:p>
+          </p:txBody>
+        </p:sp>
+        <p:sp>
+          <p:nvSpPr>
+            <p:cNvPr id="59" name="TextBox 58">
+              <a:extLst>
+                <a:ext uri="{FF2B5EF4-FFF2-40B4-BE49-F238E27FC236}">
+                  <a16:creationId xmlns:a16="http://schemas.microsoft.com/office/drawing/2014/main" id="{5014F895-D911-C741-91C0-2F9692BA8446}"/>
+                </a:ext>
+              </a:extLst>
+            </p:cNvPr>
+            <p:cNvSpPr txBox="1"/>
+            <p:nvPr/>
+          </p:nvSpPr>
+          <p:spPr>
+            <a:xfrm>
+              <a:off x="2870664" y="3531551"/>
+              <a:ext cx="1599156" cy="369332"/>
+            </a:xfrm>
+            <a:prstGeom prst="rect">
+              <a:avLst/>
+            </a:prstGeom>
+            <a:noFill/>
+          </p:spPr>
+          <p:txBody>
+            <a:bodyPr wrap="none" rtlCol="0">
+              <a:spAutoFit/>
+            </a:bodyPr>
+            <a:lstStyle/>
+            <a:p>
+              <a:pPr algn="ctr"/>
+              <a:r>
+                <a:rPr lang="en-US" dirty="0"/>
+                <a:t>Fixes to Testing</a:t>
+              </a:r>
+            </a:p>
+          </p:txBody>
+        </p:sp>
+      </p:grpSp>
     </p:spTree>
     <p:extLst>
       <p:ext uri="{BB962C8B-B14F-4D97-AF65-F5344CB8AC3E}">

</xml_diff>